<commit_message>
trying to work with ajax
</commit_message>
<xml_diff>
--- a/Documents/المخططات/مخطط ERD.pptx
+++ b/Documents/المخططات/مخطط ERD.pptx
@@ -254,7 +254,7 @@
           <a:p>
             <a:fld id="{D3B573F3-C353-4DE9-8F3B-296C28169EA7}" type="datetimeFigureOut">
               <a:rPr lang="ar-YE" smtClean="0"/>
-              <a:t>19/07/1445</a:t>
+              <a:t>22/07/1445</a:t>
             </a:fld>
             <a:endParaRPr lang="ar-YE"/>
           </a:p>
@@ -424,7 +424,7 @@
           <a:p>
             <a:fld id="{D3B573F3-C353-4DE9-8F3B-296C28169EA7}" type="datetimeFigureOut">
               <a:rPr lang="ar-YE" smtClean="0"/>
-              <a:t>19/07/1445</a:t>
+              <a:t>22/07/1445</a:t>
             </a:fld>
             <a:endParaRPr lang="ar-YE"/>
           </a:p>
@@ -604,7 +604,7 @@
           <a:p>
             <a:fld id="{D3B573F3-C353-4DE9-8F3B-296C28169EA7}" type="datetimeFigureOut">
               <a:rPr lang="ar-YE" smtClean="0"/>
-              <a:t>19/07/1445</a:t>
+              <a:t>22/07/1445</a:t>
             </a:fld>
             <a:endParaRPr lang="ar-YE"/>
           </a:p>
@@ -774,7 +774,7 @@
           <a:p>
             <a:fld id="{D3B573F3-C353-4DE9-8F3B-296C28169EA7}" type="datetimeFigureOut">
               <a:rPr lang="ar-YE" smtClean="0"/>
-              <a:t>19/07/1445</a:t>
+              <a:t>22/07/1445</a:t>
             </a:fld>
             <a:endParaRPr lang="ar-YE"/>
           </a:p>
@@ -1018,7 +1018,7 @@
           <a:p>
             <a:fld id="{D3B573F3-C353-4DE9-8F3B-296C28169EA7}" type="datetimeFigureOut">
               <a:rPr lang="ar-YE" smtClean="0"/>
-              <a:t>19/07/1445</a:t>
+              <a:t>22/07/1445</a:t>
             </a:fld>
             <a:endParaRPr lang="ar-YE"/>
           </a:p>
@@ -1250,7 +1250,7 @@
           <a:p>
             <a:fld id="{D3B573F3-C353-4DE9-8F3B-296C28169EA7}" type="datetimeFigureOut">
               <a:rPr lang="ar-YE" smtClean="0"/>
-              <a:t>19/07/1445</a:t>
+              <a:t>22/07/1445</a:t>
             </a:fld>
             <a:endParaRPr lang="ar-YE"/>
           </a:p>
@@ -1617,7 +1617,7 @@
           <a:p>
             <a:fld id="{D3B573F3-C353-4DE9-8F3B-296C28169EA7}" type="datetimeFigureOut">
               <a:rPr lang="ar-YE" smtClean="0"/>
-              <a:t>19/07/1445</a:t>
+              <a:t>22/07/1445</a:t>
             </a:fld>
             <a:endParaRPr lang="ar-YE"/>
           </a:p>
@@ -1735,7 +1735,7 @@
           <a:p>
             <a:fld id="{D3B573F3-C353-4DE9-8F3B-296C28169EA7}" type="datetimeFigureOut">
               <a:rPr lang="ar-YE" smtClean="0"/>
-              <a:t>19/07/1445</a:t>
+              <a:t>22/07/1445</a:t>
             </a:fld>
             <a:endParaRPr lang="ar-YE"/>
           </a:p>
@@ -1830,7 +1830,7 @@
           <a:p>
             <a:fld id="{D3B573F3-C353-4DE9-8F3B-296C28169EA7}" type="datetimeFigureOut">
               <a:rPr lang="ar-YE" smtClean="0"/>
-              <a:t>19/07/1445</a:t>
+              <a:t>22/07/1445</a:t>
             </a:fld>
             <a:endParaRPr lang="ar-YE"/>
           </a:p>
@@ -2107,7 +2107,7 @@
           <a:p>
             <a:fld id="{D3B573F3-C353-4DE9-8F3B-296C28169EA7}" type="datetimeFigureOut">
               <a:rPr lang="ar-YE" smtClean="0"/>
-              <a:t>19/07/1445</a:t>
+              <a:t>22/07/1445</a:t>
             </a:fld>
             <a:endParaRPr lang="ar-YE"/>
           </a:p>
@@ -2364,7 +2364,7 @@
           <a:p>
             <a:fld id="{D3B573F3-C353-4DE9-8F3B-296C28169EA7}" type="datetimeFigureOut">
               <a:rPr lang="ar-YE" smtClean="0"/>
-              <a:t>19/07/1445</a:t>
+              <a:t>22/07/1445</a:t>
             </a:fld>
             <a:endParaRPr lang="ar-YE"/>
           </a:p>
@@ -2577,7 +2577,7 @@
           <a:p>
             <a:fld id="{D3B573F3-C353-4DE9-8F3B-296C28169EA7}" type="datetimeFigureOut">
               <a:rPr lang="ar-YE" smtClean="0"/>
-              <a:t>19/07/1445</a:t>
+              <a:t>22/07/1445</a:t>
             </a:fld>
             <a:endParaRPr lang="ar-YE"/>
           </a:p>
@@ -5371,13 +5371,18 @@
           <a:p>
             <a:pPr algn="ctr"/>
             <a:r>
-              <a:rPr lang="ar-YE" sz="2400" dirty="0">
+              <a:rPr lang="ar-SA" sz="2400" dirty="0">
                 <a:latin typeface="Microsoft Sans Serif" panose="020B0604020202020204" pitchFamily="34" charset="0"/>
                 <a:ea typeface="Microsoft Sans Serif" panose="020B0604020202020204" pitchFamily="34" charset="0"/>
                 <a:cs typeface="Microsoft Sans Serif" panose="020B0604020202020204" pitchFamily="34" charset="0"/>
               </a:rPr>
-              <a:t>الغياب</a:t>
-            </a:r>
+              <a:t>متابعة</a:t>
+            </a:r>
+            <a:endParaRPr lang="ar-YE" sz="2400" dirty="0">
+              <a:latin typeface="Microsoft Sans Serif" panose="020B0604020202020204" pitchFamily="34" charset="0"/>
+              <a:ea typeface="Microsoft Sans Serif" panose="020B0604020202020204" pitchFamily="34" charset="0"/>
+              <a:cs typeface="Microsoft Sans Serif" panose="020B0604020202020204" pitchFamily="34" charset="0"/>
+            </a:endParaRPr>
           </a:p>
         </p:txBody>
       </p:sp>

</xml_diff>